<commit_message>
Fixed a few things
</commit_message>
<xml_diff>
--- a/MLB_Powerpoint.pptx
+++ b/MLB_Powerpoint.pptx
@@ -119,6 +119,11 @@
       </a:defRPr>
     </a:lvl9pPr>
   </p:defaultTextStyle>
+  <p:extLst>
+    <p:ext uri="{EFAFB233-063F-42B5-8137-9DF3F51BA10A}">
+      <p15:sldGuideLst xmlns:p15="http://schemas.microsoft.com/office/powerpoint/2012/main"/>
+    </p:ext>
+  </p:extLst>
 </p:presentation>
 </file>
 
@@ -525,7 +530,7 @@
           <a:p>
             <a:fld id="{B39DE4F2-2FC1-4D63-B0CD-562562E2B31E}" type="datetimeFigureOut">
               <a:rPr lang="en-US" smtClean="0"/>
-              <a:t>12/22/2020</a:t>
+              <a:t>12/23/2020</a:t>
             </a:fld>
             <a:endParaRPr lang="en-US"/>
           </a:p>
@@ -704,7 +709,7 @@
           <a:p>
             <a:fld id="{B39DE4F2-2FC1-4D63-B0CD-562562E2B31E}" type="datetimeFigureOut">
               <a:rPr lang="en-US" smtClean="0"/>
-              <a:t>12/22/2020</a:t>
+              <a:t>12/23/2020</a:t>
             </a:fld>
             <a:endParaRPr lang="en-US"/>
           </a:p>
@@ -884,7 +889,7 @@
           <a:p>
             <a:fld id="{B39DE4F2-2FC1-4D63-B0CD-562562E2B31E}" type="datetimeFigureOut">
               <a:rPr lang="en-US" smtClean="0"/>
-              <a:t>12/22/2020</a:t>
+              <a:t>12/23/2020</a:t>
             </a:fld>
             <a:endParaRPr lang="en-US"/>
           </a:p>
@@ -1054,7 +1059,7 @@
           <a:p>
             <a:fld id="{B39DE4F2-2FC1-4D63-B0CD-562562E2B31E}" type="datetimeFigureOut">
               <a:rPr lang="en-US" smtClean="0"/>
-              <a:t>12/22/2020</a:t>
+              <a:t>12/23/2020</a:t>
             </a:fld>
             <a:endParaRPr lang="en-US"/>
           </a:p>
@@ -1367,7 +1372,7 @@
           <a:p>
             <a:fld id="{B39DE4F2-2FC1-4D63-B0CD-562562E2B31E}" type="datetimeFigureOut">
               <a:rPr lang="en-US" smtClean="0"/>
-              <a:t>12/22/2020</a:t>
+              <a:t>12/23/2020</a:t>
             </a:fld>
             <a:endParaRPr lang="en-US"/>
           </a:p>
@@ -1753,7 +1758,7 @@
           <a:p>
             <a:fld id="{B39DE4F2-2FC1-4D63-B0CD-562562E2B31E}" type="datetimeFigureOut">
               <a:rPr lang="en-US" smtClean="0"/>
-              <a:t>12/22/2020</a:t>
+              <a:t>12/23/2020</a:t>
             </a:fld>
             <a:endParaRPr lang="en-US"/>
           </a:p>
@@ -2187,7 +2192,7 @@
           <a:p>
             <a:fld id="{B39DE4F2-2FC1-4D63-B0CD-562562E2B31E}" type="datetimeFigureOut">
               <a:rPr lang="en-US" smtClean="0"/>
-              <a:t>12/22/2020</a:t>
+              <a:t>12/23/2020</a:t>
             </a:fld>
             <a:endParaRPr lang="en-US"/>
           </a:p>
@@ -2305,7 +2310,7 @@
           <a:p>
             <a:fld id="{B39DE4F2-2FC1-4D63-B0CD-562562E2B31E}" type="datetimeFigureOut">
               <a:rPr lang="en-US" smtClean="0"/>
-              <a:t>12/22/2020</a:t>
+              <a:t>12/23/2020</a:t>
             </a:fld>
             <a:endParaRPr lang="en-US"/>
           </a:p>
@@ -2400,7 +2405,7 @@
           <a:p>
             <a:fld id="{B39DE4F2-2FC1-4D63-B0CD-562562E2B31E}" type="datetimeFigureOut">
               <a:rPr lang="en-US" smtClean="0"/>
-              <a:t>12/22/2020</a:t>
+              <a:t>12/23/2020</a:t>
             </a:fld>
             <a:endParaRPr lang="en-US"/>
           </a:p>
@@ -2750,7 +2755,7 @@
           <a:p>
             <a:fld id="{B39DE4F2-2FC1-4D63-B0CD-562562E2B31E}" type="datetimeFigureOut">
               <a:rPr lang="en-US" smtClean="0"/>
-              <a:t>12/22/2020</a:t>
+              <a:t>12/23/2020</a:t>
             </a:fld>
             <a:endParaRPr lang="en-US"/>
           </a:p>
@@ -3175,7 +3180,7 @@
           <a:p>
             <a:fld id="{B39DE4F2-2FC1-4D63-B0CD-562562E2B31E}" type="datetimeFigureOut">
               <a:rPr lang="en-US" smtClean="0"/>
-              <a:t>12/22/2020</a:t>
+              <a:t>12/23/2020</a:t>
             </a:fld>
             <a:endParaRPr lang="en-US"/>
           </a:p>
@@ -3456,7 +3461,7 @@
           <a:p>
             <a:fld id="{B39DE4F2-2FC1-4D63-B0CD-562562E2B31E}" type="datetimeFigureOut">
               <a:rPr lang="en-US" smtClean="0"/>
-              <a:t>12/22/2020</a:t>
+              <a:t>12/23/2020</a:t>
             </a:fld>
             <a:endParaRPr lang="en-US"/>
           </a:p>
@@ -4752,76 +4757,6 @@
           </a:xfrm>
         </p:spPr>
       </p:pic>
-      <p:sp>
-        <p:nvSpPr>
-          <p:cNvPr id="8" name="TextBox 7">
-            <a:extLst>
-              <a:ext uri="{FF2B5EF4-FFF2-40B4-BE49-F238E27FC236}">
-                <a16:creationId xmlns:a16="http://schemas.microsoft.com/office/drawing/2014/main" id="{1BBC4777-BC8F-4A5C-97C1-E5CBC1A6733A}"/>
-              </a:ext>
-            </a:extLst>
-          </p:cNvPr>
-          <p:cNvSpPr txBox="1"/>
-          <p:nvPr/>
-        </p:nvSpPr>
-        <p:spPr>
-          <a:xfrm>
-            <a:off x="3048778" y="3244334"/>
-            <a:ext cx="6097554" cy="369332"/>
-          </a:xfrm>
-          <a:prstGeom prst="rect">
-            <a:avLst/>
-          </a:prstGeom>
-          <a:noFill/>
-        </p:spPr>
-        <p:txBody>
-          <a:bodyPr wrap="square">
-            <a:spAutoFit/>
-          </a:bodyPr>
-          <a:lstStyle/>
-          <a:p>
-            <a:r>
-              <a:rPr lang="en-US" dirty="0"/>
-              <a:t>Winner STD’s from Mean</a:t>
-            </a:r>
-          </a:p>
-        </p:txBody>
-      </p:sp>
-      <p:sp>
-        <p:nvSpPr>
-          <p:cNvPr id="10" name="TextBox 9">
-            <a:extLst>
-              <a:ext uri="{FF2B5EF4-FFF2-40B4-BE49-F238E27FC236}">
-                <a16:creationId xmlns:a16="http://schemas.microsoft.com/office/drawing/2014/main" id="{F0235C08-CEFB-4D02-9B4F-923E532F2360}"/>
-              </a:ext>
-            </a:extLst>
-          </p:cNvPr>
-          <p:cNvSpPr txBox="1"/>
-          <p:nvPr/>
-        </p:nvSpPr>
-        <p:spPr>
-          <a:xfrm>
-            <a:off x="3048778" y="3244334"/>
-            <a:ext cx="6097554" cy="369332"/>
-          </a:xfrm>
-          <a:prstGeom prst="rect">
-            <a:avLst/>
-          </a:prstGeom>
-          <a:noFill/>
-        </p:spPr>
-        <p:txBody>
-          <a:bodyPr wrap="square">
-            <a:spAutoFit/>
-          </a:bodyPr>
-          <a:lstStyle/>
-          <a:p>
-            <a:r>
-              <a:rPr lang="en-US" dirty="0"/>
-              <a:t>Winner STD’s from Mean</a:t>
-            </a:r>
-          </a:p>
-        </p:txBody>
-      </p:sp>
     </p:spTree>
     <p:extLst>
       <p:ext uri="{BB962C8B-B14F-4D97-AF65-F5344CB8AC3E}">

</xml_diff>